<commit_message>
Update future effects slide
</commit_message>
<xml_diff>
--- a/documentation/pres_phs.pptx
+++ b/documentation/pres_phs.pptx
@@ -205,7 +205,7 @@
           <a:p>
             <a:fld id="{DB58AC54-0CA5-44AB-9462-15980807500D}" type="datetimeFigureOut">
               <a:rPr lang="en-GB" smtClean="0"/>
-              <a:t>03/02/2022</a:t>
+              <a:t>04/02/2022</a:t>
             </a:fld>
             <a:endParaRPr lang="en-GB"/>
           </a:p>
@@ -4530,8 +4530,8 @@
         </p:nvSpPr>
         <p:spPr>
           <a:xfrm>
-            <a:off x="1026368" y="1605538"/>
-            <a:ext cx="7977674" cy="2308324"/>
+            <a:off x="995371" y="1948518"/>
+            <a:ext cx="7977674" cy="2246769"/>
           </a:xfrm>
           <a:prstGeom prst="rect">
             <a:avLst/>
@@ -4549,8 +4549,8 @@
               <a:buChar char="•"/>
             </a:pPr>
             <a:r>
-              <a:rPr lang="en-US" dirty="0"/>
-              <a:t>Due to the previously trends of winter seen as there was a decrease in attendance in hospitals for an extended period of time this proves that a number of people went untreated therefore inducing a back log and will put a strain on the current health care system. This strain is exacerbated by the pandemic and the need for social distancing and new clinical procedures to limit the spread of the virus long covid</a:t>
+              <a:rPr lang="en-GB" sz="2800" dirty="0"/>
+              <a:t>Major backlog due to cancellations and delays</a:t>
             </a:r>
           </a:p>
           <a:p>
@@ -4558,7 +4558,7 @@
               <a:buFont typeface="Arial" panose="020B0604020202020204" pitchFamily="34" charset="0"/>
               <a:buChar char="•"/>
             </a:pPr>
-            <a:endParaRPr lang="en-US" dirty="0"/>
+            <a:endParaRPr lang="en-GB" sz="2800" dirty="0"/>
           </a:p>
           <a:p>
             <a:pPr marL="285750" indent="-285750">
@@ -4566,10 +4566,26 @@
               <a:buChar char="•"/>
             </a:pPr>
             <a:r>
-              <a:rPr lang="en-US" dirty="0"/>
-              <a:t>Equivalent rebound to the dip </a:t>
-            </a:r>
-            <a:endParaRPr lang="en-GB" dirty="0"/>
+              <a:rPr lang="en-GB" sz="2800" dirty="0"/>
+              <a:t>Increase in the number of admissions</a:t>
+            </a:r>
+          </a:p>
+          <a:p>
+            <a:pPr marL="285750" indent="-285750">
+              <a:buFont typeface="Arial" panose="020B0604020202020204" pitchFamily="34" charset="0"/>
+              <a:buChar char="•"/>
+            </a:pPr>
+            <a:endParaRPr lang="en-GB" sz="2800" dirty="0"/>
+          </a:p>
+          <a:p>
+            <a:pPr marL="285750" indent="-285750">
+              <a:buFont typeface="Arial" panose="020B0604020202020204" pitchFamily="34" charset="0"/>
+              <a:buChar char="•"/>
+            </a:pPr>
+            <a:r>
+              <a:rPr lang="en-GB" sz="2800" dirty="0"/>
+              <a:t>Increase in overall waiting times</a:t>
+            </a:r>
           </a:p>
         </p:txBody>
       </p:sp>
@@ -5109,6 +5125,29 @@
 </file>
 
 <file path=customXml/item1.xml><?xml version="1.0" encoding="utf-8"?>
+<p:properties xmlns:p="http://schemas.microsoft.com/office/2006/metadata/properties" xmlns:xsi="http://www.w3.org/2001/XMLSchema-instance" xmlns:pc="http://schemas.microsoft.com/office/infopath/2007/PartnerControls">
+  <documentManagement>
+    <SharedWithUsers xmlns="b134d4f5-2915-41cd-ac98-98cd822a119e">
+      <UserInfo>
+        <DisplayName/>
+        <AccountId xsi:nil="true"/>
+        <AccountType/>
+      </UserInfo>
+    </SharedWithUsers>
+  </documentManagement>
+</p:properties>
+</file>
+
+<file path=customXml/item2.xml><?xml version="1.0" encoding="utf-8"?>
+<?mso-contentType ?>
+<FormTemplates xmlns="http://schemas.microsoft.com/sharepoint/v3/contenttype/forms">
+  <Display>DocumentLibraryForm</Display>
+  <Edit>DocumentLibraryForm</Edit>
+  <New>DocumentLibraryForm</New>
+</FormTemplates>
+</file>
+
+<file path=customXml/item3.xml><?xml version="1.0" encoding="utf-8"?>
 <ct:contentTypeSchema xmlns:ct="http://schemas.microsoft.com/office/2006/metadata/contentType" xmlns:ma="http://schemas.microsoft.com/office/2006/metadata/properties/metaAttributes" ct:_="" ma:_="" ma:contentTypeName="Document" ma:contentTypeID="0x01010089DBEC408BD8C541BF1D0A7A8185C73A" ma:contentTypeVersion="12" ma:contentTypeDescription="Create a new document." ma:contentTypeScope="" ma:versionID="facabb8aa984d0d3774c59da9b89c4d8">
   <xsd:schema xmlns:xsd="http://www.w3.org/2001/XMLSchema" xmlns:xs="http://www.w3.org/2001/XMLSchema" xmlns:p="http://schemas.microsoft.com/office/2006/metadata/properties" xmlns:ns2="05319bfa-3f65-44d8-9f91-bfd83a0e1198" xmlns:ns3="b134d4f5-2915-41cd-ac98-98cd822a119e" targetNamespace="http://schemas.microsoft.com/office/2006/metadata/properties" ma:root="true" ma:fieldsID="5cdd2d8a927ab4e2f0be1df0f9880cf7" ns2:_="" ns3:_="">
     <xsd:import namespace="05319bfa-3f65-44d8-9f91-bfd83a0e1198"/>
@@ -5325,30 +5364,31 @@
 </ct:contentTypeSchema>
 </file>
 
-<file path=customXml/item2.xml><?xml version="1.0" encoding="utf-8"?>
-<?mso-contentType ?>
-<FormTemplates xmlns="http://schemas.microsoft.com/sharepoint/v3/contenttype/forms">
-  <Display>DocumentLibraryForm</Display>
-  <Edit>DocumentLibraryForm</Edit>
-  <New>DocumentLibraryForm</New>
-</FormTemplates>
+<file path=customXml/itemProps1.xml><?xml version="1.0" encoding="utf-8"?>
+<ds:datastoreItem xmlns:ds="http://schemas.openxmlformats.org/officeDocument/2006/customXml" ds:itemID="{4C73297F-598B-4DCB-BCE9-E508A25225E1}">
+  <ds:schemaRefs>
+    <ds:schemaRef ds:uri="http://purl.org/dc/terms/"/>
+    <ds:schemaRef ds:uri="http://purl.org/dc/elements/1.1/"/>
+    <ds:schemaRef ds:uri="http://www.w3.org/XML/1998/namespace"/>
+    <ds:schemaRef ds:uri="http://schemas.microsoft.com/office/2006/metadata/properties"/>
+    <ds:schemaRef ds:uri="http://schemas.microsoft.com/office/2006/documentManagement/types"/>
+    <ds:schemaRef ds:uri="http://purl.org/dc/dcmitype/"/>
+    <ds:schemaRef ds:uri="http://schemas.microsoft.com/office/infopath/2007/PartnerControls"/>
+    <ds:schemaRef ds:uri="http://schemas.openxmlformats.org/package/2006/metadata/core-properties"/>
+    <ds:schemaRef ds:uri="b134d4f5-2915-41cd-ac98-98cd822a119e"/>
+  </ds:schemaRefs>
+</ds:datastoreItem>
 </file>
 
-<file path=customXml/item3.xml><?xml version="1.0" encoding="utf-8"?>
-<p:properties xmlns:p="http://schemas.microsoft.com/office/2006/metadata/properties" xmlns:xsi="http://www.w3.org/2001/XMLSchema-instance" xmlns:pc="http://schemas.microsoft.com/office/infopath/2007/PartnerControls">
-  <documentManagement>
-    <SharedWithUsers xmlns="b134d4f5-2915-41cd-ac98-98cd822a119e">
-      <UserInfo>
-        <DisplayName/>
-        <AccountId xsi:nil="true"/>
-        <AccountType/>
-      </UserInfo>
-    </SharedWithUsers>
-  </documentManagement>
-</p:properties>
+<file path=customXml/itemProps2.xml><?xml version="1.0" encoding="utf-8"?>
+<ds:datastoreItem xmlns:ds="http://schemas.openxmlformats.org/officeDocument/2006/customXml" ds:itemID="{AD6B120D-A0FB-4DD8-992E-3D48283A8AF5}">
+  <ds:schemaRefs>
+    <ds:schemaRef ds:uri="http://schemas.microsoft.com/sharepoint/v3/contenttype/forms"/>
+  </ds:schemaRefs>
+</ds:datastoreItem>
 </file>
 
-<file path=customXml/itemProps1.xml><?xml version="1.0" encoding="utf-8"?>
+<file path=customXml/itemProps3.xml><?xml version="1.0" encoding="utf-8"?>
 <ds:datastoreItem xmlns:ds="http://schemas.openxmlformats.org/officeDocument/2006/customXml" ds:itemID="{C2C63015-15A7-477A-9C22-03E711AAC252}">
   <ds:schemaRefs>
     <ds:schemaRef ds:uri="http://schemas.microsoft.com/office/2006/metadata/contentType"/>
@@ -5365,28 +5405,4 @@
     <ds:schemaRef ds:uri="http://schemas.microsoft.com/internal/obd"/>
   </ds:schemaRefs>
 </ds:datastoreItem>
-</file>
-
-<file path=customXml/itemProps2.xml><?xml version="1.0" encoding="utf-8"?>
-<ds:datastoreItem xmlns:ds="http://schemas.openxmlformats.org/officeDocument/2006/customXml" ds:itemID="{AD6B120D-A0FB-4DD8-992E-3D48283A8AF5}">
-  <ds:schemaRefs>
-    <ds:schemaRef ds:uri="http://schemas.microsoft.com/sharepoint/v3/contenttype/forms"/>
-  </ds:schemaRefs>
-</ds:datastoreItem>
-</file>
-
-<file path=customXml/itemProps3.xml><?xml version="1.0" encoding="utf-8"?>
-<ds:datastoreItem xmlns:ds="http://schemas.openxmlformats.org/officeDocument/2006/customXml" ds:itemID="{4C73297F-598B-4DCB-BCE9-E508A25225E1}">
-  <ds:schemaRefs>
-    <ds:schemaRef ds:uri="http://purl.org/dc/terms/"/>
-    <ds:schemaRef ds:uri="http://purl.org/dc/elements/1.1/"/>
-    <ds:schemaRef ds:uri="http://www.w3.org/XML/1998/namespace"/>
-    <ds:schemaRef ds:uri="http://schemas.microsoft.com/office/2006/metadata/properties"/>
-    <ds:schemaRef ds:uri="http://schemas.microsoft.com/office/2006/documentManagement/types"/>
-    <ds:schemaRef ds:uri="http://purl.org/dc/dcmitype/"/>
-    <ds:schemaRef ds:uri="http://schemas.microsoft.com/office/infopath/2007/PartnerControls"/>
-    <ds:schemaRef ds:uri="http://schemas.openxmlformats.org/package/2006/metadata/core-properties"/>
-    <ds:schemaRef ds:uri="b134d4f5-2915-41cd-ac98-98cd822a119e"/>
-  </ds:schemaRefs>
-</ds:datastoreItem>
 </file>
</xml_diff>